<commit_message>
Update ItC - Procedure 02 - ROBOTC IOs.pptx
</commit_message>
<xml_diff>
--- a/Procedures/ItC - Procedure 02 - ROBOTC IOs.pptx
+++ b/Procedures/ItC - Procedure 02 - ROBOTC IOs.pptx
@@ -10,6 +10,9 @@
     <p:sldId id="292" r:id="rId7"/>
     <p:sldId id="293" r:id="rId8"/>
     <p:sldId id="294" r:id="rId9"/>
+    <p:sldId id="295" r:id="rId10"/>
+    <p:sldId id="296" r:id="rId11"/>
+    <p:sldId id="297" r:id="rId12"/>
   </p:sldIdLst>
   <p:sldSz cx="12192000" cy="6858000"/>
   <p:notesSz cx="6858000" cy="9144000"/>
@@ -263,7 +266,7 @@
           <a:p>
             <a:fld id="{124434E0-930D-44C7-8E44-2EB47E640525}" type="datetimeFigureOut">
               <a:rPr lang="en-US" smtClean="0"/>
-              <a:t>1/13/2020</a:t>
+              <a:t>1/14/2020</a:t>
             </a:fld>
             <a:endParaRPr lang="en-US"/>
           </a:p>
@@ -461,7 +464,7 @@
           <a:p>
             <a:fld id="{124434E0-930D-44C7-8E44-2EB47E640525}" type="datetimeFigureOut">
               <a:rPr lang="en-US" smtClean="0"/>
-              <a:t>1/13/2020</a:t>
+              <a:t>1/14/2020</a:t>
             </a:fld>
             <a:endParaRPr lang="en-US"/>
           </a:p>
@@ -669,7 +672,7 @@
           <a:p>
             <a:fld id="{124434E0-930D-44C7-8E44-2EB47E640525}" type="datetimeFigureOut">
               <a:rPr lang="en-US" smtClean="0"/>
-              <a:t>1/13/2020</a:t>
+              <a:t>1/14/2020</a:t>
             </a:fld>
             <a:endParaRPr lang="en-US"/>
           </a:p>
@@ -867,7 +870,7 @@
           <a:p>
             <a:fld id="{124434E0-930D-44C7-8E44-2EB47E640525}" type="datetimeFigureOut">
               <a:rPr lang="en-US" smtClean="0"/>
-              <a:t>1/13/2020</a:t>
+              <a:t>1/14/2020</a:t>
             </a:fld>
             <a:endParaRPr lang="en-US"/>
           </a:p>
@@ -1142,7 +1145,7 @@
           <a:p>
             <a:fld id="{124434E0-930D-44C7-8E44-2EB47E640525}" type="datetimeFigureOut">
               <a:rPr lang="en-US" smtClean="0"/>
-              <a:t>1/13/2020</a:t>
+              <a:t>1/14/2020</a:t>
             </a:fld>
             <a:endParaRPr lang="en-US"/>
           </a:p>
@@ -1407,7 +1410,7 @@
           <a:p>
             <a:fld id="{124434E0-930D-44C7-8E44-2EB47E640525}" type="datetimeFigureOut">
               <a:rPr lang="en-US" smtClean="0"/>
-              <a:t>1/13/2020</a:t>
+              <a:t>1/14/2020</a:t>
             </a:fld>
             <a:endParaRPr lang="en-US"/>
           </a:p>
@@ -1819,7 +1822,7 @@
           <a:p>
             <a:fld id="{124434E0-930D-44C7-8E44-2EB47E640525}" type="datetimeFigureOut">
               <a:rPr lang="en-US" smtClean="0"/>
-              <a:t>1/13/2020</a:t>
+              <a:t>1/14/2020</a:t>
             </a:fld>
             <a:endParaRPr lang="en-US"/>
           </a:p>
@@ -1960,7 +1963,7 @@
           <a:p>
             <a:fld id="{124434E0-930D-44C7-8E44-2EB47E640525}" type="datetimeFigureOut">
               <a:rPr lang="en-US" smtClean="0"/>
-              <a:t>1/13/2020</a:t>
+              <a:t>1/14/2020</a:t>
             </a:fld>
             <a:endParaRPr lang="en-US"/>
           </a:p>
@@ -2073,7 +2076,7 @@
           <a:p>
             <a:fld id="{124434E0-930D-44C7-8E44-2EB47E640525}" type="datetimeFigureOut">
               <a:rPr lang="en-US" smtClean="0"/>
-              <a:t>1/13/2020</a:t>
+              <a:t>1/14/2020</a:t>
             </a:fld>
             <a:endParaRPr lang="en-US"/>
           </a:p>
@@ -2384,7 +2387,7 @@
           <a:p>
             <a:fld id="{124434E0-930D-44C7-8E44-2EB47E640525}" type="datetimeFigureOut">
               <a:rPr lang="en-US" smtClean="0"/>
-              <a:t>1/13/2020</a:t>
+              <a:t>1/14/2020</a:t>
             </a:fld>
             <a:endParaRPr lang="en-US"/>
           </a:p>
@@ -2672,7 +2675,7 @@
           <a:p>
             <a:fld id="{124434E0-930D-44C7-8E44-2EB47E640525}" type="datetimeFigureOut">
               <a:rPr lang="en-US" smtClean="0"/>
-              <a:t>1/13/2020</a:t>
+              <a:t>1/14/2020</a:t>
             </a:fld>
             <a:endParaRPr lang="en-US"/>
           </a:p>
@@ -2913,7 +2916,7 @@
           <a:p>
             <a:fld id="{124434E0-930D-44C7-8E44-2EB47E640525}" type="datetimeFigureOut">
               <a:rPr lang="en-US" smtClean="0"/>
-              <a:t>1/13/2020</a:t>
+              <a:t>1/14/2020</a:t>
             </a:fld>
             <a:endParaRPr lang="en-US"/>
           </a:p>
@@ -5014,7 +5017,7 @@
         </p:spPr>
         <p:txBody>
           <a:bodyPr vert="horz" lIns="91440" tIns="45720" rIns="91440" bIns="45720" rtlCol="0" anchor="t">
-            <a:normAutofit fontScale="92500"/>
+            <a:normAutofit/>
           </a:bodyPr>
           <a:lstStyle/>
           <a:p>
@@ -5158,16 +5161,19 @@
                 <a:ea typeface="Times New Roman" panose="02020603050405020304" pitchFamily="18" charset="0"/>
                 <a:cs typeface="Times New Roman" panose="02020603050405020304" pitchFamily="18" charset="0"/>
               </a:rPr>
-              <a:t>Test the program and troubleshoot if needed until the expected behavior has occurred.</a:t>
-            </a:r>
-            <a:endParaRPr lang="en-US" dirty="0">
-              <a:latin typeface="Gill Sans MT" panose="020B0502020104020203" pitchFamily="34" charset="0"/>
-              <a:ea typeface="Times New Roman" panose="02020603050405020304" pitchFamily="18" charset="0"/>
-              <a:cs typeface="Times New Roman" panose="02020603050405020304" pitchFamily="18" charset="0"/>
-            </a:endParaRPr>
-          </a:p>
-          <a:p>
-            <a:pPr marL="342900" marR="0" lvl="0" indent="-342900">
+              <a:t>Test </a:t>
+            </a:r>
+            <a:r>
+              <a:rPr lang="en-US" dirty="0">
+                <a:latin typeface="Gill Sans MT" panose="020B0502020104020203" pitchFamily="34" charset="0"/>
+                <a:ea typeface="Times New Roman" panose="02020603050405020304" pitchFamily="18" charset="0"/>
+                <a:cs typeface="Times New Roman" panose="02020603050405020304" pitchFamily="18" charset="0"/>
+              </a:rPr>
+              <a:t>and troubleshoot if needed</a:t>
+            </a:r>
+          </a:p>
+          <a:p>
+            <a:pPr marL="514350" marR="0" lvl="0" indent="-514350">
               <a:spcBef>
                 <a:spcPts val="0"/>
               </a:spcBef>
@@ -5175,9 +5181,9 @@
                 <a:spcPts val="600"/>
               </a:spcAft>
               <a:buFont typeface="+mj-lt"/>
-              <a:buAutoNum type="arabicPeriod" startAt="6"/>
+              <a:buAutoNum type="arabicPeriod" startAt="7"/>
               <a:tabLst>
-                <a:tab pos="228600" algn="l"/>
+                <a:tab pos="401638" algn="l"/>
               </a:tabLst>
             </a:pPr>
             <a:r>
@@ -5186,76 +5192,7 @@
                 <a:ea typeface="Times New Roman" panose="02020603050405020304" pitchFamily="18" charset="0"/>
                 <a:cs typeface="Times New Roman" panose="02020603050405020304" pitchFamily="18" charset="0"/>
               </a:rPr>
-              <a:t>Modify the program above to include this </a:t>
-            </a:r>
-            <a:r>
-              <a:rPr lang="x-none" dirty="0">
-                <a:latin typeface="Gill Sans MT" panose="020B0502020104020203" pitchFamily="34" charset="0"/>
-                <a:ea typeface="Times New Roman" panose="02020603050405020304" pitchFamily="18" charset="0"/>
-                <a:cs typeface="Times New Roman" panose="02020603050405020304" pitchFamily="18" charset="0"/>
-              </a:rPr>
-              <a:t>simple behavior</a:t>
-            </a:r>
-            <a:r>
-              <a:rPr lang="en-US" dirty="0">
-                <a:latin typeface="Gill Sans MT" panose="020B0502020104020203" pitchFamily="34" charset="0"/>
-                <a:ea typeface="Times New Roman" panose="02020603050405020304" pitchFamily="18" charset="0"/>
-                <a:cs typeface="Times New Roman" panose="02020603050405020304" pitchFamily="18" charset="0"/>
-              </a:rPr>
-              <a:t>.</a:t>
-            </a:r>
-          </a:p>
-          <a:p>
-            <a:pPr marL="914400" marR="0" indent="0">
-              <a:spcBef>
-                <a:spcPts val="0"/>
-              </a:spcBef>
-              <a:spcAft>
-                <a:spcPts val="600"/>
-              </a:spcAft>
-              <a:tabLst>
-                <a:tab pos="228600" algn="l"/>
-                <a:tab pos="457200" algn="l"/>
-              </a:tabLst>
-            </a:pPr>
-            <a:r>
-              <a:rPr lang="en-US" dirty="0">
-                <a:latin typeface="Gill Sans MT" panose="020B0502020104020203" pitchFamily="34" charset="0"/>
-                <a:ea typeface="Times New Roman" panose="02020603050405020304" pitchFamily="18" charset="0"/>
-                <a:cs typeface="Times New Roman" panose="02020603050405020304" pitchFamily="18" charset="0"/>
-              </a:rPr>
-              <a:t>Reverse both motors using two different programming methods.</a:t>
-            </a:r>
-          </a:p>
-          <a:p>
-            <a:pPr marL="344488" marR="0" lvl="0" indent="-344488">
-              <a:spcBef>
-                <a:spcPts val="0"/>
-              </a:spcBef>
-              <a:spcAft>
-                <a:spcPts val="600"/>
-              </a:spcAft>
-              <a:buFont typeface="+mj-lt"/>
-              <a:buAutoNum type="arabicPeriod" startAt="8"/>
-              <a:tabLst>
-                <a:tab pos="401638" algn="l"/>
-              </a:tabLst>
-            </a:pPr>
-            <a:r>
-              <a:rPr lang="x-none" dirty="0">
-                <a:latin typeface="Gill Sans MT" panose="020B0502020104020203" pitchFamily="34" charset="0"/>
-                <a:ea typeface="Times New Roman" panose="02020603050405020304" pitchFamily="18" charset="0"/>
-                <a:cs typeface="Times New Roman" panose="02020603050405020304" pitchFamily="18" charset="0"/>
-              </a:rPr>
-              <a:t>Test the program and troubleshoot if needed until the expected behavior has occurred.</a:t>
-            </a:r>
-            <a:r>
-              <a:rPr lang="en-US" dirty="0">
-                <a:latin typeface="Gill Sans MT" panose="020B0502020104020203" pitchFamily="34" charset="0"/>
-                <a:ea typeface="Times New Roman" panose="02020603050405020304" pitchFamily="18" charset="0"/>
-                <a:cs typeface="Times New Roman" panose="02020603050405020304" pitchFamily="18" charset="0"/>
-              </a:rPr>
-              <a:t> Save the program.</a:t>
+              <a:t>Save the program. Show your instructor.</a:t>
             </a:r>
           </a:p>
           <a:p>
@@ -5489,7 +5426,7 @@
         </p:spPr>
         <p:txBody>
           <a:bodyPr vert="horz" lIns="91440" tIns="45720" rIns="91440" bIns="45720" rtlCol="0" anchor="t">
-            <a:normAutofit fontScale="92500" lnSpcReduction="20000"/>
+            <a:normAutofit fontScale="92500" lnSpcReduction="10000"/>
           </a:bodyPr>
           <a:lstStyle/>
           <a:p>
@@ -5501,7 +5438,7 @@
                 <a:spcPts val="600"/>
               </a:spcAft>
               <a:buFont typeface="+mj-lt"/>
-              <a:buAutoNum type="arabicPeriod" startAt="9"/>
+              <a:buAutoNum type="arabicPeriod" startAt="8"/>
               <a:tabLst>
                 <a:tab pos="228600" algn="l"/>
               </a:tabLst>
@@ -5643,7 +5580,7 @@
           <a:p>
             <a:pPr marL="514350" indent="-514350">
               <a:buFont typeface="+mj-lt"/>
-              <a:buAutoNum type="arabicPeriod" startAt="9"/>
+              <a:buAutoNum type="arabicPeriod" startAt="8"/>
             </a:pPr>
             <a:r>
               <a:rPr lang="en-US" dirty="0">
@@ -5651,13 +5588,13 @@
                 <a:ea typeface="Times New Roman" panose="02020603050405020304" pitchFamily="18" charset="0"/>
                 <a:cs typeface="Times New Roman" panose="02020603050405020304" pitchFamily="18" charset="0"/>
               </a:rPr>
-              <a:t>Test the program and troubleshoot if needed until the expected behavior has occurred.</a:t>
+              <a:t>Test and troubleshoot as needed.</a:t>
             </a:r>
           </a:p>
           <a:p>
             <a:pPr marL="514350" indent="-514350">
               <a:buFont typeface="+mj-lt"/>
-              <a:buAutoNum type="arabicPeriod" startAt="9"/>
+              <a:buAutoNum type="arabicPeriod" startAt="8"/>
             </a:pPr>
             <a:r>
               <a:rPr lang="x-none" dirty="0">
@@ -5687,7 +5624,19 @@
               <a:rPr lang="x-none" dirty="0">
                 <a:latin typeface="Gill Sans MT" panose="020B0502020104020203" pitchFamily="34" charset="0"/>
               </a:rPr>
-              <a:t>ownload the program. If you have any errors, check with your instructor to troubleshoot your program.</a:t>
+              <a:t>ownload the program. If you have any errors, check with your instructor to troubleshoot your program</a:t>
+            </a:r>
+            <a:r>
+              <a:rPr lang="en-US" dirty="0">
+                <a:latin typeface="Gill Sans MT" panose="020B0502020104020203" pitchFamily="34" charset="0"/>
+              </a:rPr>
+              <a:t> and for sign-off when ready</a:t>
+            </a:r>
+            <a:r>
+              <a:rPr lang="x-none" dirty="0">
+                <a:latin typeface="Gill Sans MT" panose="020B0502020104020203" pitchFamily="34" charset="0"/>
+              </a:rPr>
+              <a:t>.</a:t>
             </a:r>
             <a:endParaRPr lang="en-US" dirty="0">
               <a:latin typeface="Gill Sans MT" panose="020B0502020104020203" pitchFamily="34" charset="0"/>
@@ -5755,6 +5704,1379 @@
     <p:extLst>
       <p:ext uri="{BB962C8B-B14F-4D97-AF65-F5344CB8AC3E}">
         <p14:creationId xmlns:p14="http://schemas.microsoft.com/office/powerpoint/2010/main" val="2261699973"/>
+      </p:ext>
+    </p:extLst>
+  </p:cSld>
+  <p:clrMapOvr>
+    <a:masterClrMapping/>
+  </p:clrMapOvr>
+</p:sld>
+</file>
+
+<file path=ppt/slides/slide6.xml><?xml version="1.0" encoding="utf-8"?>
+<p:sld xmlns:a="http://schemas.openxmlformats.org/drawingml/2006/main" xmlns:r="http://schemas.openxmlformats.org/officeDocument/2006/relationships" xmlns:p="http://schemas.openxmlformats.org/presentationml/2006/main">
+  <p:cSld>
+    <p:spTree>
+      <p:nvGrpSpPr>
+        <p:cNvPr id="1" name=""/>
+        <p:cNvGrpSpPr/>
+        <p:nvPr/>
+      </p:nvGrpSpPr>
+      <p:grpSpPr>
+        <a:xfrm>
+          <a:off x="0" y="0"/>
+          <a:ext cx="0" cy="0"/>
+          <a:chOff x="0" y="0"/>
+          <a:chExt cx="0" cy="0"/>
+        </a:xfrm>
+      </p:grpSpPr>
+      <p:sp>
+        <p:nvSpPr>
+          <p:cNvPr id="2" name="Title 1">
+            <a:extLst>
+              <a:ext uri="{FF2B5EF4-FFF2-40B4-BE49-F238E27FC236}">
+                <a16:creationId xmlns:a16="http://schemas.microsoft.com/office/drawing/2014/main" id="{B76CFA0B-C199-444E-8940-6B60D25AFDD5}"/>
+              </a:ext>
+            </a:extLst>
+          </p:cNvPr>
+          <p:cNvSpPr>
+            <a:spLocks noGrp="1"/>
+          </p:cNvSpPr>
+          <p:nvPr>
+            <p:ph type="title"/>
+          </p:nvPr>
+        </p:nvSpPr>
+        <p:spPr/>
+        <p:txBody>
+          <a:bodyPr/>
+          <a:lstStyle/>
+          <a:p>
+            <a:r>
+              <a:rPr lang="en-US" dirty="0">
+                <a:latin typeface="Gill Sans MT"/>
+              </a:rPr>
+              <a:t>ROBOTC Input Programming</a:t>
+            </a:r>
+            <a:endParaRPr lang="en-US" dirty="0"/>
+          </a:p>
+        </p:txBody>
+      </p:sp>
+      <p:pic>
+        <p:nvPicPr>
+          <p:cNvPr id="5" name="Picture 4" descr="A picture containing clipart&#10;&#10;Description generated with very high confidence">
+            <a:extLst>
+              <a:ext uri="{FF2B5EF4-FFF2-40B4-BE49-F238E27FC236}">
+                <a16:creationId xmlns:a16="http://schemas.microsoft.com/office/drawing/2014/main" id="{99E8C4C4-8D26-437B-BE14-F297FF84DC73}"/>
+              </a:ext>
+            </a:extLst>
+          </p:cNvPr>
+          <p:cNvPicPr>
+            <a:picLocks noChangeAspect="1"/>
+          </p:cNvPicPr>
+          <p:nvPr/>
+        </p:nvPicPr>
+        <p:blipFill>
+          <a:blip r:embed="rId2"/>
+          <a:stretch>
+            <a:fillRect/>
+          </a:stretch>
+        </p:blipFill>
+        <p:spPr>
+          <a:xfrm>
+            <a:off x="10131286" y="140092"/>
+            <a:ext cx="1933575" cy="1552575"/>
+          </a:xfrm>
+          <a:prstGeom prst="rect">
+            <a:avLst/>
+          </a:prstGeom>
+        </p:spPr>
+      </p:pic>
+      <p:cxnSp>
+        <p:nvCxnSpPr>
+          <p:cNvPr id="8" name="Straight Connector 7">
+            <a:extLst>
+              <a:ext uri="{FF2B5EF4-FFF2-40B4-BE49-F238E27FC236}">
+                <a16:creationId xmlns:a16="http://schemas.microsoft.com/office/drawing/2014/main" id="{A526314C-1DDC-4964-B707-B3E95A941B55}"/>
+              </a:ext>
+            </a:extLst>
+          </p:cNvPr>
+          <p:cNvCxnSpPr/>
+          <p:nvPr/>
+        </p:nvCxnSpPr>
+        <p:spPr>
+          <a:xfrm>
+            <a:off x="68580" y="6507480"/>
+            <a:ext cx="6080760" cy="0"/>
+          </a:xfrm>
+          <a:prstGeom prst="line">
+            <a:avLst/>
+          </a:prstGeom>
+          <a:ln w="12700">
+            <a:solidFill>
+              <a:schemeClr val="tx1"/>
+            </a:solidFill>
+          </a:ln>
+        </p:spPr>
+        <p:style>
+          <a:lnRef idx="1">
+            <a:schemeClr val="accent1"/>
+          </a:lnRef>
+          <a:fillRef idx="0">
+            <a:schemeClr val="accent1"/>
+          </a:fillRef>
+          <a:effectRef idx="0">
+            <a:schemeClr val="accent1"/>
+          </a:effectRef>
+          <a:fontRef idx="minor">
+            <a:schemeClr val="tx1"/>
+          </a:fontRef>
+        </p:style>
+      </p:cxnSp>
+      <p:sp>
+        <p:nvSpPr>
+          <p:cNvPr id="10" name="Content Placeholder 2">
+            <a:extLst>
+              <a:ext uri="{FF2B5EF4-FFF2-40B4-BE49-F238E27FC236}">
+                <a16:creationId xmlns:a16="http://schemas.microsoft.com/office/drawing/2014/main" id="{7F945C55-91EA-4E45-B895-6BBDE2CA9040}"/>
+              </a:ext>
+            </a:extLst>
+          </p:cNvPr>
+          <p:cNvSpPr>
+            <a:spLocks noGrp="1"/>
+          </p:cNvSpPr>
+          <p:nvPr>
+            <p:ph idx="1"/>
+          </p:nvPr>
+        </p:nvSpPr>
+        <p:spPr>
+          <a:xfrm>
+            <a:off x="838200" y="1825625"/>
+            <a:ext cx="10515600" cy="4351338"/>
+          </a:xfrm>
+        </p:spPr>
+        <p:txBody>
+          <a:bodyPr vert="horz" lIns="91440" tIns="45720" rIns="91440" bIns="45720" rtlCol="0" anchor="t">
+            <a:normAutofit/>
+          </a:bodyPr>
+          <a:lstStyle/>
+          <a:p>
+            <a:pPr marL="342900" marR="0" lvl="0" indent="-342900">
+              <a:spcBef>
+                <a:spcPts val="0"/>
+              </a:spcBef>
+              <a:spcAft>
+                <a:spcPts val="600"/>
+              </a:spcAft>
+              <a:buFont typeface="+mj-lt"/>
+              <a:buAutoNum type="arabicPeriod"/>
+              <a:tabLst>
+                <a:tab pos="228600" algn="l"/>
+              </a:tabLst>
+            </a:pPr>
+            <a:r>
+              <a:rPr lang="en-US" dirty="0">
+                <a:latin typeface="Gill Sans MT" panose="020B0502020104020203" pitchFamily="34" charset="0"/>
+                <a:ea typeface="Times New Roman" panose="02020603050405020304" pitchFamily="18" charset="0"/>
+              </a:rPr>
+              <a:t>Ensure Procedure 01 has been followed and all connections are set.</a:t>
+            </a:r>
+          </a:p>
+          <a:p>
+            <a:pPr marL="342900" indent="-342900">
+              <a:spcBef>
+                <a:spcPts val="0"/>
+              </a:spcBef>
+              <a:spcAft>
+                <a:spcPts val="600"/>
+              </a:spcAft>
+              <a:buFont typeface="+mj-lt"/>
+              <a:buAutoNum type="arabicPeriod"/>
+              <a:tabLst>
+                <a:tab pos="228600" algn="l"/>
+              </a:tabLst>
+            </a:pPr>
+            <a:r>
+              <a:rPr lang="en-US" altLang="en-US" dirty="0">
+                <a:latin typeface="Gill Sans MT" panose="020B0502020104020203" pitchFamily="34" charset="0"/>
+                <a:ea typeface="Times New Roman" panose="02020603050405020304" pitchFamily="18" charset="0"/>
+                <a:cs typeface="Arial" panose="020B0604020202020204" pitchFamily="34" charset="0"/>
+              </a:rPr>
+              <a:t>Here is an example of a program for a motor that is activated/inactivated with a bump switch, which would be typed in the </a:t>
+            </a:r>
+            <a:r>
+              <a:rPr lang="en-US" altLang="en-US" sz="2400" dirty="0">
+                <a:latin typeface="Courier New" panose="02070309020205020404" pitchFamily="49" charset="0"/>
+                <a:ea typeface="Batang" panose="020B0503020000020004" pitchFamily="18" charset="-127"/>
+                <a:cs typeface="Courier New" panose="02070309020205020404" pitchFamily="49" charset="0"/>
+              </a:rPr>
+              <a:t>task main()</a:t>
+            </a:r>
+            <a:r>
+              <a:rPr lang="en-US" altLang="en-US" sz="2400" i="1" dirty="0">
+                <a:latin typeface="Courier New" panose="02070309020205020404" pitchFamily="49" charset="0"/>
+                <a:ea typeface="Times New Roman" panose="02020603050405020304" pitchFamily="18" charset="0"/>
+                <a:cs typeface="Courier New" panose="02070309020205020404" pitchFamily="49" charset="0"/>
+              </a:rPr>
+              <a:t> </a:t>
+            </a:r>
+            <a:r>
+              <a:rPr lang="en-US" altLang="en-US" dirty="0">
+                <a:latin typeface="Gill Sans MT" panose="020B0502020104020203" pitchFamily="34" charset="0"/>
+                <a:ea typeface="Times New Roman" panose="02020603050405020304" pitchFamily="18" charset="0"/>
+                <a:cs typeface="Arial" panose="020B0604020202020204" pitchFamily="34" charset="0"/>
+              </a:rPr>
+              <a:t>section of the program between the curly braces. Type the program and compile it using the following steps.</a:t>
+            </a:r>
+            <a:endParaRPr lang="en-US" altLang="en-US" sz="1600" dirty="0">
+              <a:latin typeface="Gill Sans MT" panose="020B0502020104020203" pitchFamily="34" charset="0"/>
+            </a:endParaRPr>
+          </a:p>
+          <a:p>
+            <a:pPr marL="0" marR="0" lvl="0" indent="0">
+              <a:spcBef>
+                <a:spcPts val="0"/>
+              </a:spcBef>
+              <a:spcAft>
+                <a:spcPts val="600"/>
+              </a:spcAft>
+              <a:buNone/>
+              <a:tabLst>
+                <a:tab pos="228600" algn="l"/>
+              </a:tabLst>
+            </a:pPr>
+            <a:endParaRPr lang="en-US" dirty="0">
+              <a:latin typeface="Gill Sans MT" panose="020B0502020104020203" pitchFamily="34" charset="0"/>
+              <a:ea typeface="Times New Roman" panose="02020603050405020304" pitchFamily="18" charset="0"/>
+            </a:endParaRPr>
+          </a:p>
+          <a:p>
+            <a:pPr>
+              <a:lnSpc>
+                <a:spcPct val="150000"/>
+              </a:lnSpc>
+              <a:tabLst>
+                <a:tab pos="1828800" algn="l"/>
+                <a:tab pos="4341813" algn="r"/>
+                <a:tab pos="4802188" algn="l"/>
+              </a:tabLst>
+            </a:pPr>
+            <a:endParaRPr lang="en-US" dirty="0">
+              <a:latin typeface="Gill Sans MT" panose="020B0502020104020203" pitchFamily="34" charset="0"/>
+            </a:endParaRPr>
+          </a:p>
+        </p:txBody>
+      </p:sp>
+      <p:sp>
+        <p:nvSpPr>
+          <p:cNvPr id="14" name="TextBox 13">
+            <a:extLst>
+              <a:ext uri="{FF2B5EF4-FFF2-40B4-BE49-F238E27FC236}">
+                <a16:creationId xmlns:a16="http://schemas.microsoft.com/office/drawing/2014/main" id="{7CFB2747-91EE-4FBF-86A8-5FC0606F20B7}"/>
+              </a:ext>
+            </a:extLst>
+          </p:cNvPr>
+          <p:cNvSpPr txBox="1"/>
+          <p:nvPr/>
+        </p:nvSpPr>
+        <p:spPr>
+          <a:xfrm>
+            <a:off x="0" y="6507480"/>
+            <a:ext cx="6183872" cy="338554"/>
+          </a:xfrm>
+          <a:prstGeom prst="rect">
+            <a:avLst/>
+          </a:prstGeom>
+          <a:noFill/>
+        </p:spPr>
+        <p:txBody>
+          <a:bodyPr wrap="none" rtlCol="0" anchor="t">
+            <a:spAutoFit/>
+          </a:bodyPr>
+          <a:lstStyle/>
+          <a:p>
+            <a:r>
+              <a:rPr lang="en-US" sz="1600" dirty="0">
+                <a:solidFill>
+                  <a:srgbClr val="C00000"/>
+                </a:solidFill>
+                <a:latin typeface="Gill Sans MT"/>
+              </a:rPr>
+              <a:t>Lafayette Jefferson High School – Intro to Communications – Mr.  White</a:t>
+            </a:r>
+          </a:p>
+        </p:txBody>
+      </p:sp>
+      <p:graphicFrame>
+        <p:nvGraphicFramePr>
+          <p:cNvPr id="4" name="Table 3">
+            <a:extLst>
+              <a:ext uri="{FF2B5EF4-FFF2-40B4-BE49-F238E27FC236}">
+                <a16:creationId xmlns:a16="http://schemas.microsoft.com/office/drawing/2014/main" id="{5B514EE1-EB51-4980-93AE-A996589D66F4}"/>
+              </a:ext>
+            </a:extLst>
+          </p:cNvPr>
+          <p:cNvGraphicFramePr>
+            <a:graphicFrameLocks noGrp="1"/>
+          </p:cNvGraphicFramePr>
+          <p:nvPr>
+            <p:extLst>
+              <p:ext uri="{D42A27DB-BD31-4B8C-83A1-F6EECF244321}">
+                <p14:modId xmlns:p14="http://schemas.microsoft.com/office/powerpoint/2010/main" val="521359471"/>
+              </p:ext>
+            </p:extLst>
+          </p:nvPr>
+        </p:nvGraphicFramePr>
+        <p:xfrm>
+          <a:off x="3352800" y="4183707"/>
+          <a:ext cx="5486400" cy="960120"/>
+        </p:xfrm>
+        <a:graphic>
+          <a:graphicData uri="http://schemas.openxmlformats.org/drawingml/2006/table">
+            <a:tbl>
+              <a:tblPr firstRow="1" firstCol="1" bandRow="1"/>
+              <a:tblGrid>
+                <a:gridCol w="5486400">
+                  <a:extLst>
+                    <a:ext uri="{9D8B030D-6E8A-4147-A177-3AD203B41FA5}">
+                      <a16:colId xmlns:a16="http://schemas.microsoft.com/office/drawing/2014/main" val="2730331120"/>
+                    </a:ext>
+                  </a:extLst>
+                </a:gridCol>
+              </a:tblGrid>
+              <a:tr h="0">
+                <a:tc>
+                  <a:txBody>
+                    <a:bodyPr/>
+                    <a:lstStyle/>
+                    <a:p>
+                      <a:pPr marL="685800" marR="0" indent="0">
+                        <a:spcBef>
+                          <a:spcPts val="0"/>
+                        </a:spcBef>
+                        <a:spcAft>
+                          <a:spcPts val="600"/>
+                        </a:spcAft>
+                        <a:tabLst>
+                          <a:tab pos="457200" algn="l"/>
+                          <a:tab pos="457200" algn="l"/>
+                        </a:tabLst>
+                      </a:pPr>
+                      <a:r>
+                        <a:rPr lang="en-US" sz="1200" dirty="0" err="1">
+                          <a:effectLst/>
+                          <a:latin typeface="Courier New" panose="02070309020205020404" pitchFamily="49" charset="0"/>
+                          <a:ea typeface="Times New Roman" panose="02020603050405020304" pitchFamily="18" charset="0"/>
+                          <a:cs typeface="Times New Roman" panose="02020603050405020304" pitchFamily="18" charset="0"/>
+                        </a:rPr>
+                        <a:t>untilBump</a:t>
+                      </a:r>
+                      <a:r>
+                        <a:rPr lang="en-US" sz="1200" dirty="0">
+                          <a:effectLst/>
+                          <a:latin typeface="Courier New" panose="02070309020205020404" pitchFamily="49" charset="0"/>
+                          <a:ea typeface="Times New Roman" panose="02020603050405020304" pitchFamily="18" charset="0"/>
+                          <a:cs typeface="Times New Roman" panose="02020603050405020304" pitchFamily="18" charset="0"/>
+                        </a:rPr>
+                        <a:t>(</a:t>
+                      </a:r>
+                      <a:r>
+                        <a:rPr lang="en-US" sz="1200" dirty="0" err="1">
+                          <a:effectLst/>
+                          <a:latin typeface="Courier New" panose="02070309020205020404" pitchFamily="49" charset="0"/>
+                          <a:ea typeface="Times New Roman" panose="02020603050405020304" pitchFamily="18" charset="0"/>
+                          <a:cs typeface="Times New Roman" panose="02020603050405020304" pitchFamily="18" charset="0"/>
+                        </a:rPr>
+                        <a:t>bumpSwitch</a:t>
+                      </a:r>
+                      <a:r>
+                        <a:rPr lang="en-US" sz="1200" dirty="0">
+                          <a:effectLst/>
+                          <a:latin typeface="Courier New" panose="02070309020205020404" pitchFamily="49" charset="0"/>
+                          <a:ea typeface="Times New Roman" panose="02020603050405020304" pitchFamily="18" charset="0"/>
+                          <a:cs typeface="Times New Roman" panose="02020603050405020304" pitchFamily="18" charset="0"/>
+                        </a:rPr>
+                        <a:t>);</a:t>
+                      </a:r>
+                      <a:endParaRPr lang="en-US" sz="1200" dirty="0">
+                        <a:effectLst/>
+                        <a:latin typeface="Arial" panose="020B0604020202020204" pitchFamily="34" charset="0"/>
+                        <a:ea typeface="Times New Roman" panose="02020603050405020304" pitchFamily="18" charset="0"/>
+                        <a:cs typeface="Times New Roman" panose="02020603050405020304" pitchFamily="18" charset="0"/>
+                      </a:endParaRPr>
+                    </a:p>
+                    <a:p>
+                      <a:pPr marL="685800" marR="0" indent="0">
+                        <a:spcBef>
+                          <a:spcPts val="0"/>
+                        </a:spcBef>
+                        <a:spcAft>
+                          <a:spcPts val="600"/>
+                        </a:spcAft>
+                        <a:tabLst>
+                          <a:tab pos="457200" algn="l"/>
+                          <a:tab pos="457200" algn="l"/>
+                        </a:tabLst>
+                      </a:pPr>
+                      <a:r>
+                        <a:rPr lang="en-US" sz="1200" dirty="0" err="1">
+                          <a:effectLst/>
+                          <a:latin typeface="Courier New" panose="02070309020205020404" pitchFamily="49" charset="0"/>
+                          <a:ea typeface="Times New Roman" panose="02020603050405020304" pitchFamily="18" charset="0"/>
+                          <a:cs typeface="Times New Roman" panose="02020603050405020304" pitchFamily="18" charset="0"/>
+                        </a:rPr>
+                        <a:t>startMotor</a:t>
+                      </a:r>
+                      <a:r>
+                        <a:rPr lang="en-US" sz="1200" dirty="0">
+                          <a:effectLst/>
+                          <a:latin typeface="Courier New" panose="02070309020205020404" pitchFamily="49" charset="0"/>
+                          <a:ea typeface="Times New Roman" panose="02020603050405020304" pitchFamily="18" charset="0"/>
+                          <a:cs typeface="Times New Roman" panose="02020603050405020304" pitchFamily="18" charset="0"/>
+                        </a:rPr>
+                        <a:t>(</a:t>
+                      </a:r>
+                      <a:r>
+                        <a:rPr lang="en-US" sz="1200" dirty="0" err="1">
+                          <a:effectLst/>
+                          <a:latin typeface="Courier New" panose="02070309020205020404" pitchFamily="49" charset="0"/>
+                          <a:ea typeface="Times New Roman" panose="02020603050405020304" pitchFamily="18" charset="0"/>
+                          <a:cs typeface="Times New Roman" panose="02020603050405020304" pitchFamily="18" charset="0"/>
+                        </a:rPr>
+                        <a:t>rightMotor</a:t>
+                      </a:r>
+                      <a:r>
+                        <a:rPr lang="en-US" sz="1200" dirty="0">
+                          <a:effectLst/>
+                          <a:latin typeface="Courier New" panose="02070309020205020404" pitchFamily="49" charset="0"/>
+                          <a:ea typeface="Times New Roman" panose="02020603050405020304" pitchFamily="18" charset="0"/>
+                          <a:cs typeface="Times New Roman" panose="02020603050405020304" pitchFamily="18" charset="0"/>
+                        </a:rPr>
+                        <a:t>, 67);</a:t>
+                      </a:r>
+                      <a:endParaRPr lang="en-US" sz="1200" dirty="0">
+                        <a:effectLst/>
+                        <a:latin typeface="Arial" panose="020B0604020202020204" pitchFamily="34" charset="0"/>
+                        <a:ea typeface="Times New Roman" panose="02020603050405020304" pitchFamily="18" charset="0"/>
+                        <a:cs typeface="Times New Roman" panose="02020603050405020304" pitchFamily="18" charset="0"/>
+                      </a:endParaRPr>
+                    </a:p>
+                    <a:p>
+                      <a:pPr marL="685800" marR="0" indent="0">
+                        <a:spcBef>
+                          <a:spcPts val="0"/>
+                        </a:spcBef>
+                        <a:spcAft>
+                          <a:spcPts val="600"/>
+                        </a:spcAft>
+                        <a:tabLst>
+                          <a:tab pos="457200" algn="l"/>
+                          <a:tab pos="457200" algn="l"/>
+                        </a:tabLst>
+                      </a:pPr>
+                      <a:r>
+                        <a:rPr lang="en-US" sz="1200" dirty="0">
+                          <a:effectLst/>
+                          <a:latin typeface="Courier New" panose="02070309020205020404" pitchFamily="49" charset="0"/>
+                          <a:ea typeface="Times New Roman" panose="02020603050405020304" pitchFamily="18" charset="0"/>
+                          <a:cs typeface="Times New Roman" panose="02020603050405020304" pitchFamily="18" charset="0"/>
+                        </a:rPr>
+                        <a:t>wait(5);</a:t>
+                      </a:r>
+                      <a:endParaRPr lang="en-US" sz="1200" dirty="0">
+                        <a:effectLst/>
+                        <a:latin typeface="Arial" panose="020B0604020202020204" pitchFamily="34" charset="0"/>
+                        <a:ea typeface="Times New Roman" panose="02020603050405020304" pitchFamily="18" charset="0"/>
+                        <a:cs typeface="Times New Roman" panose="02020603050405020304" pitchFamily="18" charset="0"/>
+                      </a:endParaRPr>
+                    </a:p>
+                    <a:p>
+                      <a:pPr marL="685800" marR="0" indent="0">
+                        <a:spcBef>
+                          <a:spcPts val="0"/>
+                        </a:spcBef>
+                        <a:spcAft>
+                          <a:spcPts val="600"/>
+                        </a:spcAft>
+                        <a:tabLst>
+                          <a:tab pos="457200" algn="l"/>
+                          <a:tab pos="457200" algn="l"/>
+                        </a:tabLst>
+                      </a:pPr>
+                      <a:r>
+                        <a:rPr lang="en-US" sz="1200" dirty="0" err="1">
+                          <a:effectLst/>
+                          <a:latin typeface="Courier New" panose="02070309020205020404" pitchFamily="49" charset="0"/>
+                          <a:ea typeface="Times New Roman" panose="02020603050405020304" pitchFamily="18" charset="0"/>
+                          <a:cs typeface="Times New Roman" panose="02020603050405020304" pitchFamily="18" charset="0"/>
+                        </a:rPr>
+                        <a:t>stopMotor</a:t>
+                      </a:r>
+                      <a:r>
+                        <a:rPr lang="en-US" sz="1200" dirty="0">
+                          <a:effectLst/>
+                          <a:latin typeface="Courier New" panose="02070309020205020404" pitchFamily="49" charset="0"/>
+                          <a:ea typeface="Times New Roman" panose="02020603050405020304" pitchFamily="18" charset="0"/>
+                          <a:cs typeface="Times New Roman" panose="02020603050405020304" pitchFamily="18" charset="0"/>
+                        </a:rPr>
+                        <a:t>(</a:t>
+                      </a:r>
+                      <a:r>
+                        <a:rPr lang="en-US" sz="1200" dirty="0" err="1">
+                          <a:effectLst/>
+                          <a:latin typeface="Courier New" panose="02070309020205020404" pitchFamily="49" charset="0"/>
+                          <a:ea typeface="Times New Roman" panose="02020603050405020304" pitchFamily="18" charset="0"/>
+                          <a:cs typeface="Times New Roman" panose="02020603050405020304" pitchFamily="18" charset="0"/>
+                        </a:rPr>
+                        <a:t>rightMotor</a:t>
+                      </a:r>
+                      <a:r>
+                        <a:rPr lang="en-US" sz="1200" dirty="0">
+                          <a:effectLst/>
+                          <a:latin typeface="Courier New" panose="02070309020205020404" pitchFamily="49" charset="0"/>
+                          <a:ea typeface="Times New Roman" panose="02020603050405020304" pitchFamily="18" charset="0"/>
+                          <a:cs typeface="Times New Roman" panose="02020603050405020304" pitchFamily="18" charset="0"/>
+                        </a:rPr>
+                        <a:t>);</a:t>
+                      </a:r>
+                      <a:endParaRPr lang="en-US" sz="1200" dirty="0">
+                        <a:effectLst/>
+                        <a:latin typeface="Arial" panose="020B0604020202020204" pitchFamily="34" charset="0"/>
+                        <a:ea typeface="Times New Roman" panose="02020603050405020304" pitchFamily="18" charset="0"/>
+                        <a:cs typeface="Times New Roman" panose="02020603050405020304" pitchFamily="18" charset="0"/>
+                      </a:endParaRPr>
+                    </a:p>
+                  </a:txBody>
+                  <a:tcPr marL="68580" marR="68580" marT="0" marB="0">
+                    <a:lnL>
+                      <a:noFill/>
+                    </a:lnL>
+                    <a:lnR>
+                      <a:noFill/>
+                    </a:lnR>
+                    <a:lnT>
+                      <a:noFill/>
+                    </a:lnT>
+                    <a:lnB>
+                      <a:noFill/>
+                    </a:lnB>
+                  </a:tcPr>
+                </a:tc>
+                <a:extLst>
+                  <a:ext uri="{0D108BD9-81ED-4DB2-BD59-A6C34878D82A}">
+                    <a16:rowId xmlns:a16="http://schemas.microsoft.com/office/drawing/2014/main" val="525551180"/>
+                  </a:ext>
+                </a:extLst>
+              </a:tr>
+            </a:tbl>
+          </a:graphicData>
+        </a:graphic>
+      </p:graphicFrame>
+    </p:spTree>
+    <p:extLst>
+      <p:ext uri="{BB962C8B-B14F-4D97-AF65-F5344CB8AC3E}">
+        <p14:creationId xmlns:p14="http://schemas.microsoft.com/office/powerpoint/2010/main" val="3735837299"/>
+      </p:ext>
+    </p:extLst>
+  </p:cSld>
+  <p:clrMapOvr>
+    <a:masterClrMapping/>
+  </p:clrMapOvr>
+</p:sld>
+</file>
+
+<file path=ppt/slides/slide7.xml><?xml version="1.0" encoding="utf-8"?>
+<p:sld xmlns:a="http://schemas.openxmlformats.org/drawingml/2006/main" xmlns:r="http://schemas.openxmlformats.org/officeDocument/2006/relationships" xmlns:p="http://schemas.openxmlformats.org/presentationml/2006/main">
+  <p:cSld>
+    <p:spTree>
+      <p:nvGrpSpPr>
+        <p:cNvPr id="1" name=""/>
+        <p:cNvGrpSpPr/>
+        <p:nvPr/>
+      </p:nvGrpSpPr>
+      <p:grpSpPr>
+        <a:xfrm>
+          <a:off x="0" y="0"/>
+          <a:ext cx="0" cy="0"/>
+          <a:chOff x="0" y="0"/>
+          <a:chExt cx="0" cy="0"/>
+        </a:xfrm>
+      </p:grpSpPr>
+      <p:sp>
+        <p:nvSpPr>
+          <p:cNvPr id="2" name="Title 1">
+            <a:extLst>
+              <a:ext uri="{FF2B5EF4-FFF2-40B4-BE49-F238E27FC236}">
+                <a16:creationId xmlns:a16="http://schemas.microsoft.com/office/drawing/2014/main" id="{B76CFA0B-C199-444E-8940-6B60D25AFDD5}"/>
+              </a:ext>
+            </a:extLst>
+          </p:cNvPr>
+          <p:cNvSpPr>
+            <a:spLocks noGrp="1"/>
+          </p:cNvSpPr>
+          <p:nvPr>
+            <p:ph type="title"/>
+          </p:nvPr>
+        </p:nvSpPr>
+        <p:spPr/>
+        <p:txBody>
+          <a:bodyPr/>
+          <a:lstStyle/>
+          <a:p>
+            <a:r>
+              <a:rPr lang="en-US" dirty="0">
+                <a:latin typeface="Gill Sans MT"/>
+              </a:rPr>
+              <a:t>ROBOTC Input Programming Cont’d.</a:t>
+            </a:r>
+            <a:endParaRPr lang="en-US" dirty="0"/>
+          </a:p>
+        </p:txBody>
+      </p:sp>
+      <p:sp>
+        <p:nvSpPr>
+          <p:cNvPr id="10" name="Content Placeholder 2">
+            <a:extLst>
+              <a:ext uri="{FF2B5EF4-FFF2-40B4-BE49-F238E27FC236}">
+                <a16:creationId xmlns:a16="http://schemas.microsoft.com/office/drawing/2014/main" id="{7F945C55-91EA-4E45-B895-6BBDE2CA9040}"/>
+              </a:ext>
+            </a:extLst>
+          </p:cNvPr>
+          <p:cNvSpPr>
+            <a:spLocks noGrp="1"/>
+          </p:cNvSpPr>
+          <p:nvPr>
+            <p:ph sz="half" idx="1"/>
+          </p:nvPr>
+        </p:nvSpPr>
+        <p:spPr/>
+        <p:txBody>
+          <a:bodyPr vert="horz" lIns="91440" tIns="45720" rIns="91440" bIns="45720" rtlCol="0" anchor="t">
+            <a:normAutofit/>
+          </a:bodyPr>
+          <a:lstStyle/>
+          <a:p>
+            <a:pPr marL="514350" marR="0" lvl="0" indent="-514350">
+              <a:spcBef>
+                <a:spcPts val="0"/>
+              </a:spcBef>
+              <a:spcAft>
+                <a:spcPts val="600"/>
+              </a:spcAft>
+              <a:buFont typeface="+mj-lt"/>
+              <a:buAutoNum type="arabicPeriod" startAt="3"/>
+              <a:tabLst>
+                <a:tab pos="457200" algn="l"/>
+              </a:tabLst>
+            </a:pPr>
+            <a:r>
+              <a:rPr lang="en-US" dirty="0">
+                <a:latin typeface="Gill Sans MT" panose="020B0502020104020203" pitchFamily="34" charset="0"/>
+                <a:ea typeface="Times New Roman" panose="02020603050405020304" pitchFamily="18" charset="0"/>
+                <a:cs typeface="Times New Roman" panose="02020603050405020304" pitchFamily="18" charset="0"/>
+              </a:rPr>
+              <a:t>Save the program. </a:t>
+            </a:r>
+            <a:r>
+              <a:rPr lang="x-none" dirty="0">
+                <a:latin typeface="Gill Sans MT" panose="020B0502020104020203" pitchFamily="34" charset="0"/>
+                <a:ea typeface="Times New Roman" panose="02020603050405020304" pitchFamily="18" charset="0"/>
+                <a:cs typeface="Times New Roman" panose="02020603050405020304" pitchFamily="18" charset="0"/>
+              </a:rPr>
+              <a:t>Compile and download the program. If you have any errors, check with your instructor to troubleshoot your program.</a:t>
+            </a:r>
+            <a:endParaRPr lang="en-US" dirty="0">
+              <a:latin typeface="Gill Sans MT" panose="020B0502020104020203" pitchFamily="34" charset="0"/>
+              <a:ea typeface="Times New Roman" panose="02020603050405020304" pitchFamily="18" charset="0"/>
+              <a:cs typeface="Times New Roman" panose="02020603050405020304" pitchFamily="18" charset="0"/>
+            </a:endParaRPr>
+          </a:p>
+          <a:p>
+            <a:pPr marL="0" marR="0" lvl="0" indent="0">
+              <a:spcBef>
+                <a:spcPts val="0"/>
+              </a:spcBef>
+              <a:spcAft>
+                <a:spcPts val="600"/>
+              </a:spcAft>
+              <a:buNone/>
+              <a:tabLst>
+                <a:tab pos="228600" algn="l"/>
+              </a:tabLst>
+            </a:pPr>
+            <a:endParaRPr lang="en-US" dirty="0">
+              <a:latin typeface="Gill Sans MT" panose="020B0502020104020203" pitchFamily="34" charset="0"/>
+              <a:ea typeface="Times New Roman" panose="02020603050405020304" pitchFamily="18" charset="0"/>
+            </a:endParaRPr>
+          </a:p>
+          <a:p>
+            <a:pPr>
+              <a:lnSpc>
+                <a:spcPct val="150000"/>
+              </a:lnSpc>
+              <a:tabLst>
+                <a:tab pos="1828800" algn="l"/>
+                <a:tab pos="4341813" algn="r"/>
+                <a:tab pos="4802188" algn="l"/>
+              </a:tabLst>
+            </a:pPr>
+            <a:endParaRPr lang="en-US" dirty="0">
+              <a:latin typeface="Gill Sans MT" panose="020B0502020104020203" pitchFamily="34" charset="0"/>
+            </a:endParaRPr>
+          </a:p>
+        </p:txBody>
+      </p:sp>
+      <p:sp>
+        <p:nvSpPr>
+          <p:cNvPr id="4" name="Content Placeholder 3">
+            <a:extLst>
+              <a:ext uri="{FF2B5EF4-FFF2-40B4-BE49-F238E27FC236}">
+                <a16:creationId xmlns:a16="http://schemas.microsoft.com/office/drawing/2014/main" id="{1861B07C-9869-405D-B33F-65A1C23D3363}"/>
+              </a:ext>
+            </a:extLst>
+          </p:cNvPr>
+          <p:cNvSpPr>
+            <a:spLocks noGrp="1"/>
+          </p:cNvSpPr>
+          <p:nvPr>
+            <p:ph sz="half" idx="2"/>
+          </p:nvPr>
+        </p:nvSpPr>
+        <p:spPr/>
+        <p:txBody>
+          <a:bodyPr/>
+          <a:lstStyle/>
+          <a:p>
+            <a:pPr marL="514350" indent="-514350">
+              <a:spcBef>
+                <a:spcPts val="0"/>
+              </a:spcBef>
+              <a:spcAft>
+                <a:spcPts val="600"/>
+              </a:spcAft>
+              <a:buFont typeface="+mj-lt"/>
+              <a:buAutoNum type="arabicPeriod" startAt="4"/>
+              <a:tabLst>
+                <a:tab pos="457200" algn="l"/>
+              </a:tabLst>
+            </a:pPr>
+            <a:r>
+              <a:rPr lang="en-US" dirty="0">
+                <a:solidFill>
+                  <a:prstClr val="black"/>
+                </a:solidFill>
+                <a:latin typeface="Gill Sans MT" panose="020B0502020104020203" pitchFamily="34" charset="0"/>
+                <a:cs typeface="Times New Roman" panose="02020603050405020304" pitchFamily="18" charset="0"/>
+              </a:rPr>
+              <a:t>P</a:t>
+            </a:r>
+            <a:r>
+              <a:rPr lang="x-none" dirty="0">
+                <a:latin typeface="Gill Sans MT" panose="020B0502020104020203" pitchFamily="34" charset="0"/>
+              </a:rPr>
+              <a:t>ress Start to run the program and observe the behaviors.</a:t>
+            </a:r>
+            <a:endParaRPr lang="en-US" dirty="0">
+              <a:latin typeface="Gill Sans MT" panose="020B0502020104020203" pitchFamily="34" charset="0"/>
+            </a:endParaRPr>
+          </a:p>
+          <a:p>
+            <a:endParaRPr lang="en-US" dirty="0"/>
+          </a:p>
+        </p:txBody>
+      </p:sp>
+      <p:pic>
+        <p:nvPicPr>
+          <p:cNvPr id="5" name="Picture 4" descr="A picture containing clipart&#10;&#10;Description generated with very high confidence">
+            <a:extLst>
+              <a:ext uri="{FF2B5EF4-FFF2-40B4-BE49-F238E27FC236}">
+                <a16:creationId xmlns:a16="http://schemas.microsoft.com/office/drawing/2014/main" id="{99E8C4C4-8D26-437B-BE14-F297FF84DC73}"/>
+              </a:ext>
+            </a:extLst>
+          </p:cNvPr>
+          <p:cNvPicPr>
+            <a:picLocks noChangeAspect="1"/>
+          </p:cNvPicPr>
+          <p:nvPr/>
+        </p:nvPicPr>
+        <p:blipFill>
+          <a:blip r:embed="rId2"/>
+          <a:stretch>
+            <a:fillRect/>
+          </a:stretch>
+        </p:blipFill>
+        <p:spPr>
+          <a:xfrm>
+            <a:off x="10131286" y="140092"/>
+            <a:ext cx="1933575" cy="1552575"/>
+          </a:xfrm>
+          <a:prstGeom prst="rect">
+            <a:avLst/>
+          </a:prstGeom>
+        </p:spPr>
+      </p:pic>
+      <p:cxnSp>
+        <p:nvCxnSpPr>
+          <p:cNvPr id="8" name="Straight Connector 7">
+            <a:extLst>
+              <a:ext uri="{FF2B5EF4-FFF2-40B4-BE49-F238E27FC236}">
+                <a16:creationId xmlns:a16="http://schemas.microsoft.com/office/drawing/2014/main" id="{A526314C-1DDC-4964-B707-B3E95A941B55}"/>
+              </a:ext>
+            </a:extLst>
+          </p:cNvPr>
+          <p:cNvCxnSpPr/>
+          <p:nvPr/>
+        </p:nvCxnSpPr>
+        <p:spPr>
+          <a:xfrm>
+            <a:off x="68580" y="6507480"/>
+            <a:ext cx="6080760" cy="0"/>
+          </a:xfrm>
+          <a:prstGeom prst="line">
+            <a:avLst/>
+          </a:prstGeom>
+          <a:ln w="12700">
+            <a:solidFill>
+              <a:schemeClr val="tx1"/>
+            </a:solidFill>
+          </a:ln>
+        </p:spPr>
+        <p:style>
+          <a:lnRef idx="1">
+            <a:schemeClr val="accent1"/>
+          </a:lnRef>
+          <a:fillRef idx="0">
+            <a:schemeClr val="accent1"/>
+          </a:fillRef>
+          <a:effectRef idx="0">
+            <a:schemeClr val="accent1"/>
+          </a:effectRef>
+          <a:fontRef idx="minor">
+            <a:schemeClr val="tx1"/>
+          </a:fontRef>
+        </p:style>
+      </p:cxnSp>
+      <p:sp>
+        <p:nvSpPr>
+          <p:cNvPr id="14" name="TextBox 13">
+            <a:extLst>
+              <a:ext uri="{FF2B5EF4-FFF2-40B4-BE49-F238E27FC236}">
+                <a16:creationId xmlns:a16="http://schemas.microsoft.com/office/drawing/2014/main" id="{7CFB2747-91EE-4FBF-86A8-5FC0606F20B7}"/>
+              </a:ext>
+            </a:extLst>
+          </p:cNvPr>
+          <p:cNvSpPr txBox="1"/>
+          <p:nvPr/>
+        </p:nvSpPr>
+        <p:spPr>
+          <a:xfrm>
+            <a:off x="0" y="6507480"/>
+            <a:ext cx="6183872" cy="338554"/>
+          </a:xfrm>
+          <a:prstGeom prst="rect">
+            <a:avLst/>
+          </a:prstGeom>
+          <a:noFill/>
+        </p:spPr>
+        <p:txBody>
+          <a:bodyPr wrap="none" rtlCol="0" anchor="t">
+            <a:spAutoFit/>
+          </a:bodyPr>
+          <a:lstStyle/>
+          <a:p>
+            <a:r>
+              <a:rPr lang="en-US" sz="1600" dirty="0">
+                <a:solidFill>
+                  <a:srgbClr val="C00000"/>
+                </a:solidFill>
+                <a:latin typeface="Gill Sans MT"/>
+              </a:rPr>
+              <a:t>Lafayette Jefferson High School – Intro to Communications – Mr.  White</a:t>
+            </a:r>
+          </a:p>
+        </p:txBody>
+      </p:sp>
+      <p:pic>
+        <p:nvPicPr>
+          <p:cNvPr id="15" name="Picture 14">
+            <a:extLst>
+              <a:ext uri="{FF2B5EF4-FFF2-40B4-BE49-F238E27FC236}">
+                <a16:creationId xmlns:a16="http://schemas.microsoft.com/office/drawing/2014/main" id="{E570175A-E741-4067-BC44-6D5655A9B50F}"/>
+              </a:ext>
+            </a:extLst>
+          </p:cNvPr>
+          <p:cNvPicPr/>
+          <p:nvPr/>
+        </p:nvPicPr>
+        <p:blipFill>
+          <a:blip r:embed="rId3">
+            <a:extLst>
+              <a:ext uri="{28A0092B-C50C-407E-A947-70E740481C1C}">
+                <a14:useLocalDpi xmlns:a14="http://schemas.microsoft.com/office/drawing/2010/main" val="0"/>
+              </a:ext>
+            </a:extLst>
+          </a:blip>
+          <a:srcRect l="4318"/>
+          <a:stretch>
+            <a:fillRect/>
+          </a:stretch>
+        </p:blipFill>
+        <p:spPr bwMode="auto">
+          <a:xfrm>
+            <a:off x="1893214" y="3941140"/>
+            <a:ext cx="2191385" cy="2432685"/>
+          </a:xfrm>
+          <a:prstGeom prst="rect">
+            <a:avLst/>
+          </a:prstGeom>
+          <a:noFill/>
+          <a:ln>
+            <a:noFill/>
+          </a:ln>
+        </p:spPr>
+      </p:pic>
+      <p:pic>
+        <p:nvPicPr>
+          <p:cNvPr id="17" name="Picture 16">
+            <a:extLst>
+              <a:ext uri="{FF2B5EF4-FFF2-40B4-BE49-F238E27FC236}">
+                <a16:creationId xmlns:a16="http://schemas.microsoft.com/office/drawing/2014/main" id="{B461A326-3D42-4E4F-ADE2-A37001F44987}"/>
+              </a:ext>
+            </a:extLst>
+          </p:cNvPr>
+          <p:cNvPicPr/>
+          <p:nvPr/>
+        </p:nvPicPr>
+        <p:blipFill>
+          <a:blip r:embed="rId4">
+            <a:extLst>
+              <a:ext uri="{28A0092B-C50C-407E-A947-70E740481C1C}">
+                <a14:useLocalDpi xmlns:a14="http://schemas.microsoft.com/office/drawing/2010/main" val="0"/>
+              </a:ext>
+            </a:extLst>
+          </a:blip>
+          <a:srcRect/>
+          <a:stretch>
+            <a:fillRect/>
+          </a:stretch>
+        </p:blipFill>
+        <p:spPr bwMode="auto">
+          <a:xfrm>
+            <a:off x="7074814" y="3244442"/>
+            <a:ext cx="3148330" cy="1612900"/>
+          </a:xfrm>
+          <a:prstGeom prst="rect">
+            <a:avLst/>
+          </a:prstGeom>
+          <a:noFill/>
+          <a:ln>
+            <a:noFill/>
+          </a:ln>
+        </p:spPr>
+      </p:pic>
+    </p:spTree>
+    <p:extLst>
+      <p:ext uri="{BB962C8B-B14F-4D97-AF65-F5344CB8AC3E}">
+        <p14:creationId xmlns:p14="http://schemas.microsoft.com/office/powerpoint/2010/main" val="1421922606"/>
+      </p:ext>
+    </p:extLst>
+  </p:cSld>
+  <p:clrMapOvr>
+    <a:masterClrMapping/>
+  </p:clrMapOvr>
+</p:sld>
+</file>
+
+<file path=ppt/slides/slide8.xml><?xml version="1.0" encoding="utf-8"?>
+<p:sld xmlns:a="http://schemas.openxmlformats.org/drawingml/2006/main" xmlns:r="http://schemas.openxmlformats.org/officeDocument/2006/relationships" xmlns:p="http://schemas.openxmlformats.org/presentationml/2006/main">
+  <p:cSld>
+    <p:spTree>
+      <p:nvGrpSpPr>
+        <p:cNvPr id="1" name=""/>
+        <p:cNvGrpSpPr/>
+        <p:nvPr/>
+      </p:nvGrpSpPr>
+      <p:grpSpPr>
+        <a:xfrm>
+          <a:off x="0" y="0"/>
+          <a:ext cx="0" cy="0"/>
+          <a:chOff x="0" y="0"/>
+          <a:chExt cx="0" cy="0"/>
+        </a:xfrm>
+      </p:grpSpPr>
+      <p:sp>
+        <p:nvSpPr>
+          <p:cNvPr id="2" name="Title 1">
+            <a:extLst>
+              <a:ext uri="{FF2B5EF4-FFF2-40B4-BE49-F238E27FC236}">
+                <a16:creationId xmlns:a16="http://schemas.microsoft.com/office/drawing/2014/main" id="{B76CFA0B-C199-444E-8940-6B60D25AFDD5}"/>
+              </a:ext>
+            </a:extLst>
+          </p:cNvPr>
+          <p:cNvSpPr>
+            <a:spLocks noGrp="1"/>
+          </p:cNvSpPr>
+          <p:nvPr>
+            <p:ph type="title"/>
+          </p:nvPr>
+        </p:nvSpPr>
+        <p:spPr/>
+        <p:txBody>
+          <a:bodyPr/>
+          <a:lstStyle/>
+          <a:p>
+            <a:r>
+              <a:rPr lang="en-US" dirty="0">
+                <a:latin typeface="Gill Sans MT"/>
+              </a:rPr>
+              <a:t>ROBOTC Input Programming Cont’d.</a:t>
+            </a:r>
+            <a:endParaRPr lang="en-US" dirty="0"/>
+          </a:p>
+        </p:txBody>
+      </p:sp>
+      <p:pic>
+        <p:nvPicPr>
+          <p:cNvPr id="5" name="Picture 4" descr="A picture containing clipart&#10;&#10;Description generated with very high confidence">
+            <a:extLst>
+              <a:ext uri="{FF2B5EF4-FFF2-40B4-BE49-F238E27FC236}">
+                <a16:creationId xmlns:a16="http://schemas.microsoft.com/office/drawing/2014/main" id="{99E8C4C4-8D26-437B-BE14-F297FF84DC73}"/>
+              </a:ext>
+            </a:extLst>
+          </p:cNvPr>
+          <p:cNvPicPr>
+            <a:picLocks noChangeAspect="1"/>
+          </p:cNvPicPr>
+          <p:nvPr/>
+        </p:nvPicPr>
+        <p:blipFill>
+          <a:blip r:embed="rId2"/>
+          <a:stretch>
+            <a:fillRect/>
+          </a:stretch>
+        </p:blipFill>
+        <p:spPr>
+          <a:xfrm>
+            <a:off x="10131286" y="140092"/>
+            <a:ext cx="1933575" cy="1552575"/>
+          </a:xfrm>
+          <a:prstGeom prst="rect">
+            <a:avLst/>
+          </a:prstGeom>
+        </p:spPr>
+      </p:pic>
+      <p:cxnSp>
+        <p:nvCxnSpPr>
+          <p:cNvPr id="8" name="Straight Connector 7">
+            <a:extLst>
+              <a:ext uri="{FF2B5EF4-FFF2-40B4-BE49-F238E27FC236}">
+                <a16:creationId xmlns:a16="http://schemas.microsoft.com/office/drawing/2014/main" id="{A526314C-1DDC-4964-B707-B3E95A941B55}"/>
+              </a:ext>
+            </a:extLst>
+          </p:cNvPr>
+          <p:cNvCxnSpPr/>
+          <p:nvPr/>
+        </p:nvCxnSpPr>
+        <p:spPr>
+          <a:xfrm>
+            <a:off x="68580" y="6507480"/>
+            <a:ext cx="6080760" cy="0"/>
+          </a:xfrm>
+          <a:prstGeom prst="line">
+            <a:avLst/>
+          </a:prstGeom>
+          <a:ln w="12700">
+            <a:solidFill>
+              <a:schemeClr val="tx1"/>
+            </a:solidFill>
+          </a:ln>
+        </p:spPr>
+        <p:style>
+          <a:lnRef idx="1">
+            <a:schemeClr val="accent1"/>
+          </a:lnRef>
+          <a:fillRef idx="0">
+            <a:schemeClr val="accent1"/>
+          </a:fillRef>
+          <a:effectRef idx="0">
+            <a:schemeClr val="accent1"/>
+          </a:effectRef>
+          <a:fontRef idx="minor">
+            <a:schemeClr val="tx1"/>
+          </a:fontRef>
+        </p:style>
+      </p:cxnSp>
+      <p:sp>
+        <p:nvSpPr>
+          <p:cNvPr id="10" name="Content Placeholder 2">
+            <a:extLst>
+              <a:ext uri="{FF2B5EF4-FFF2-40B4-BE49-F238E27FC236}">
+                <a16:creationId xmlns:a16="http://schemas.microsoft.com/office/drawing/2014/main" id="{7F945C55-91EA-4E45-B895-6BBDE2CA9040}"/>
+              </a:ext>
+            </a:extLst>
+          </p:cNvPr>
+          <p:cNvSpPr>
+            <a:spLocks noGrp="1"/>
+          </p:cNvSpPr>
+          <p:nvPr>
+            <p:ph idx="1"/>
+          </p:nvPr>
+        </p:nvSpPr>
+        <p:spPr>
+          <a:xfrm>
+            <a:off x="838200" y="1825625"/>
+            <a:ext cx="10515600" cy="4351338"/>
+          </a:xfrm>
+        </p:spPr>
+        <p:txBody>
+          <a:bodyPr vert="horz" lIns="91440" tIns="45720" rIns="91440" bIns="45720" rtlCol="0" anchor="t">
+            <a:normAutofit lnSpcReduction="10000"/>
+          </a:bodyPr>
+          <a:lstStyle/>
+          <a:p>
+            <a:pPr marL="514350" marR="0" lvl="0" indent="-514350">
+              <a:spcBef>
+                <a:spcPts val="0"/>
+              </a:spcBef>
+              <a:spcAft>
+                <a:spcPts val="600"/>
+              </a:spcAft>
+              <a:buFont typeface="+mj-lt"/>
+              <a:buAutoNum type="arabicPeriod" startAt="5"/>
+              <a:tabLst>
+                <a:tab pos="457200" algn="l"/>
+              </a:tabLst>
+            </a:pPr>
+            <a:r>
+              <a:rPr lang="x-none" dirty="0">
+                <a:latin typeface="Gill Sans MT" panose="020B0502020104020203" pitchFamily="34" charset="0"/>
+                <a:ea typeface="Times New Roman" panose="02020603050405020304" pitchFamily="18" charset="0"/>
+                <a:cs typeface="Times New Roman" panose="02020603050405020304" pitchFamily="18" charset="0"/>
+              </a:rPr>
+              <a:t>Write a program that performs the following simple behaviors. </a:t>
+            </a:r>
+            <a:r>
+              <a:rPr lang="en-US" dirty="0">
+                <a:latin typeface="Gill Sans MT" panose="020B0502020104020203" pitchFamily="34" charset="0"/>
+                <a:ea typeface="Times New Roman" panose="02020603050405020304" pitchFamily="18" charset="0"/>
+                <a:cs typeface="Times New Roman" panose="02020603050405020304" pitchFamily="18" charset="0"/>
+              </a:rPr>
+              <a:t>Use the natural language functions where appropriate as shown below. </a:t>
+            </a:r>
+            <a:r>
+              <a:rPr lang="x-none" dirty="0">
+                <a:latin typeface="Gill Sans MT" panose="020B0502020104020203" pitchFamily="34" charset="0"/>
+                <a:ea typeface="Times New Roman" panose="02020603050405020304" pitchFamily="18" charset="0"/>
+                <a:cs typeface="Times New Roman" panose="02020603050405020304" pitchFamily="18" charset="0"/>
+              </a:rPr>
+              <a:t>Add comments at the end of each command line to explain the purpose of each step.</a:t>
+            </a:r>
+            <a:endParaRPr lang="en-US" dirty="0">
+              <a:latin typeface="Gill Sans MT" panose="020B0502020104020203" pitchFamily="34" charset="0"/>
+              <a:ea typeface="Times New Roman" panose="02020603050405020304" pitchFamily="18" charset="0"/>
+              <a:cs typeface="Times New Roman" panose="02020603050405020304" pitchFamily="18" charset="0"/>
+            </a:endParaRPr>
+          </a:p>
+          <a:p>
+            <a:pPr marL="742950" marR="0" lvl="1" indent="-285750">
+              <a:spcBef>
+                <a:spcPts val="0"/>
+              </a:spcBef>
+              <a:spcAft>
+                <a:spcPts val="600"/>
+              </a:spcAft>
+              <a:buFont typeface="+mj-lt"/>
+              <a:buAutoNum type="alphaLcPeriod"/>
+              <a:tabLst>
+                <a:tab pos="457200" algn="l"/>
+                <a:tab pos="914400" algn="l"/>
+              </a:tabLst>
+            </a:pPr>
+            <a:r>
+              <a:rPr lang="en-US" dirty="0">
+                <a:latin typeface="Gill Sans MT" panose="020B0502020104020203" pitchFamily="34" charset="0"/>
+                <a:ea typeface="Times New Roman" panose="02020603050405020304" pitchFamily="18" charset="0"/>
+                <a:cs typeface="Times New Roman" panose="02020603050405020304" pitchFamily="18" charset="0"/>
+              </a:rPr>
+              <a:t>   Wait for the bumper switch to be bumped. Note that bump means that a switch is pressed and released and not simply pressed and held.</a:t>
+            </a:r>
+          </a:p>
+          <a:p>
+            <a:pPr marL="742950" marR="0" lvl="1" indent="-285750">
+              <a:spcBef>
+                <a:spcPts val="0"/>
+              </a:spcBef>
+              <a:spcAft>
+                <a:spcPts val="600"/>
+              </a:spcAft>
+              <a:buFont typeface="+mj-lt"/>
+              <a:buAutoNum type="alphaLcPeriod"/>
+              <a:tabLst>
+                <a:tab pos="457200" algn="l"/>
+                <a:tab pos="914400" algn="l"/>
+              </a:tabLst>
+            </a:pPr>
+            <a:r>
+              <a:rPr lang="en-US" dirty="0">
+                <a:latin typeface="Gill Sans MT" panose="020B0502020104020203" pitchFamily="34" charset="0"/>
+                <a:ea typeface="Times New Roman" panose="02020603050405020304" pitchFamily="18" charset="0"/>
+                <a:cs typeface="Times New Roman" panose="02020603050405020304" pitchFamily="18" charset="0"/>
+              </a:rPr>
+              <a:t>    Both motors turn on at half power until the sensor is bumped again.</a:t>
+            </a:r>
+          </a:p>
+          <a:p>
+            <a:pPr marL="742950" marR="0" lvl="1" indent="-285750">
+              <a:spcBef>
+                <a:spcPts val="0"/>
+              </a:spcBef>
+              <a:spcAft>
+                <a:spcPts val="600"/>
+              </a:spcAft>
+              <a:buFont typeface="+mj-lt"/>
+              <a:buAutoNum type="alphaLcPeriod"/>
+              <a:tabLst>
+                <a:tab pos="457200" algn="l"/>
+                <a:tab pos="914400" algn="l"/>
+              </a:tabLst>
+            </a:pPr>
+            <a:r>
+              <a:rPr lang="en-US" dirty="0">
+                <a:latin typeface="Gill Sans MT" panose="020B0502020104020203" pitchFamily="34" charset="0"/>
+                <a:ea typeface="Times New Roman" panose="02020603050405020304" pitchFamily="18" charset="0"/>
+                <a:cs typeface="Times New Roman" panose="02020603050405020304" pitchFamily="18" charset="0"/>
+              </a:rPr>
+              <a:t>    Both motors should then move in reverse at half power for 3.5 seconds.</a:t>
+            </a:r>
+          </a:p>
+          <a:p>
+            <a:pPr marL="742950" marR="0" lvl="1" indent="-285750">
+              <a:spcBef>
+                <a:spcPts val="0"/>
+              </a:spcBef>
+              <a:spcAft>
+                <a:spcPts val="600"/>
+              </a:spcAft>
+              <a:buFont typeface="+mj-lt"/>
+              <a:buAutoNum type="alphaLcPeriod"/>
+              <a:tabLst>
+                <a:tab pos="457200" algn="l"/>
+                <a:tab pos="914400" algn="l"/>
+              </a:tabLst>
+            </a:pPr>
+            <a:r>
+              <a:rPr lang="en-US" dirty="0">
+                <a:latin typeface="Gill Sans MT" panose="020B0502020104020203" pitchFamily="34" charset="0"/>
+                <a:ea typeface="Times New Roman" panose="02020603050405020304" pitchFamily="18" charset="0"/>
+                <a:cs typeface="Times New Roman" panose="02020603050405020304" pitchFamily="18" charset="0"/>
+              </a:rPr>
+              <a:t>    Both motors will stop.</a:t>
+            </a:r>
+          </a:p>
+          <a:p>
+            <a:pPr lvl="2">
+              <a:spcBef>
+                <a:spcPts val="0"/>
+              </a:spcBef>
+              <a:spcAft>
+                <a:spcPts val="600"/>
+              </a:spcAft>
+              <a:tabLst>
+                <a:tab pos="457200" algn="l"/>
+                <a:tab pos="914400" algn="l"/>
+              </a:tabLst>
+            </a:pPr>
+            <a:r>
+              <a:rPr lang="en-US" dirty="0">
+                <a:latin typeface="Gill Sans MT" panose="020B0502020104020203" pitchFamily="34" charset="0"/>
+                <a:ea typeface="Times New Roman" panose="02020603050405020304" pitchFamily="18" charset="0"/>
+                <a:cs typeface="Times New Roman" panose="02020603050405020304" pitchFamily="18" charset="0"/>
+              </a:rPr>
+              <a:t>Use the images from Slide 3 for command help.</a:t>
+            </a:r>
+          </a:p>
+          <a:p>
+            <a:pPr marL="514350" marR="0" lvl="0" indent="-514350">
+              <a:spcBef>
+                <a:spcPts val="0"/>
+              </a:spcBef>
+              <a:spcAft>
+                <a:spcPts val="600"/>
+              </a:spcAft>
+              <a:buFont typeface="+mj-lt"/>
+              <a:buAutoNum type="arabicPeriod" startAt="6"/>
+              <a:tabLst>
+                <a:tab pos="228600" algn="l"/>
+              </a:tabLst>
+            </a:pPr>
+            <a:r>
+              <a:rPr lang="en-US" dirty="0">
+                <a:latin typeface="Gill Sans MT" panose="020B0502020104020203" pitchFamily="34" charset="0"/>
+                <a:ea typeface="Times New Roman" panose="02020603050405020304" pitchFamily="18" charset="0"/>
+              </a:rPr>
+              <a:t>Ask your Instructor to check your work.</a:t>
+            </a:r>
+          </a:p>
+          <a:p>
+            <a:pPr>
+              <a:lnSpc>
+                <a:spcPct val="150000"/>
+              </a:lnSpc>
+              <a:tabLst>
+                <a:tab pos="1828800" algn="l"/>
+                <a:tab pos="4341813" algn="r"/>
+                <a:tab pos="4802188" algn="l"/>
+              </a:tabLst>
+            </a:pPr>
+            <a:endParaRPr lang="en-US" dirty="0">
+              <a:latin typeface="Gill Sans MT" panose="020B0502020104020203" pitchFamily="34" charset="0"/>
+            </a:endParaRPr>
+          </a:p>
+        </p:txBody>
+      </p:sp>
+      <p:sp>
+        <p:nvSpPr>
+          <p:cNvPr id="14" name="TextBox 13">
+            <a:extLst>
+              <a:ext uri="{FF2B5EF4-FFF2-40B4-BE49-F238E27FC236}">
+                <a16:creationId xmlns:a16="http://schemas.microsoft.com/office/drawing/2014/main" id="{7CFB2747-91EE-4FBF-86A8-5FC0606F20B7}"/>
+              </a:ext>
+            </a:extLst>
+          </p:cNvPr>
+          <p:cNvSpPr txBox="1"/>
+          <p:nvPr/>
+        </p:nvSpPr>
+        <p:spPr>
+          <a:xfrm>
+            <a:off x="0" y="6507480"/>
+            <a:ext cx="6183872" cy="338554"/>
+          </a:xfrm>
+          <a:prstGeom prst="rect">
+            <a:avLst/>
+          </a:prstGeom>
+          <a:noFill/>
+        </p:spPr>
+        <p:txBody>
+          <a:bodyPr wrap="none" rtlCol="0" anchor="t">
+            <a:spAutoFit/>
+          </a:bodyPr>
+          <a:lstStyle/>
+          <a:p>
+            <a:r>
+              <a:rPr lang="en-US" sz="1600" dirty="0">
+                <a:solidFill>
+                  <a:srgbClr val="C00000"/>
+                </a:solidFill>
+                <a:latin typeface="Gill Sans MT"/>
+              </a:rPr>
+              <a:t>Lafayette Jefferson High School – Intro to Communications – Mr.  White</a:t>
+            </a:r>
+          </a:p>
+        </p:txBody>
+      </p:sp>
+    </p:spTree>
+    <p:extLst>
+      <p:ext uri="{BB962C8B-B14F-4D97-AF65-F5344CB8AC3E}">
+        <p14:creationId xmlns:p14="http://schemas.microsoft.com/office/powerpoint/2010/main" val="779487805"/>
       </p:ext>
     </p:extLst>
   </p:cSld>
@@ -6060,6 +7382,21 @@
 </file>
 
 <file path=customXml/item1.xml><?xml version="1.0" encoding="utf-8"?>
+<p:properties xmlns:p="http://schemas.microsoft.com/office/2006/metadata/properties" xmlns:xsi="http://www.w3.org/2001/XMLSchema-instance" xmlns:pc="http://schemas.microsoft.com/office/infopath/2007/PartnerControls">
+  <documentManagement/>
+</p:properties>
+</file>
+
+<file path=customXml/item2.xml><?xml version="1.0" encoding="utf-8"?>
+<?mso-contentType ?>
+<FormTemplates xmlns="http://schemas.microsoft.com/sharepoint/v3/contenttype/forms">
+  <Display>DocumentLibraryForm</Display>
+  <Edit>DocumentLibraryForm</Edit>
+  <New>DocumentLibraryForm</New>
+</FormTemplates>
+</file>
+
+<file path=customXml/item3.xml><?xml version="1.0" encoding="utf-8"?>
 <ct:contentTypeSchema xmlns:ct="http://schemas.microsoft.com/office/2006/metadata/contentType" xmlns:ma="http://schemas.microsoft.com/office/2006/metadata/properties/metaAttributes" ct:_="" ma:_="" ma:contentTypeName="Document" ma:contentTypeID="0x010100B2CFFF6E32BC2741AD9F46B98DF1E591" ma:contentTypeVersion="12" ma:contentTypeDescription="Create a new document." ma:contentTypeScope="" ma:versionID="cc7e5dec4cad37dcddbf4fbc40b2ba7d">
   <xsd:schema xmlns:xsd="http://www.w3.org/2001/XMLSchema" xmlns:xs="http://www.w3.org/2001/XMLSchema" xmlns:p="http://schemas.microsoft.com/office/2006/metadata/properties" xmlns:ns3="0763945f-b588-479b-8b34-69271d6243d3" xmlns:ns4="7401324f-32bb-40b2-aa72-be4933ebf616" targetNamespace="http://schemas.microsoft.com/office/2006/metadata/properties" ma:root="true" ma:fieldsID="7308f3befb4dbf03db1aba1913fb7b54" ns3:_="" ns4:_="">
     <xsd:import namespace="0763945f-b588-479b-8b34-69271d6243d3"/>
@@ -6274,22 +7611,32 @@
 </ct:contentTypeSchema>
 </file>
 
-<file path=customXml/item2.xml><?xml version="1.0" encoding="utf-8"?>
-<?mso-contentType ?>
-<FormTemplates xmlns="http://schemas.microsoft.com/sharepoint/v3/contenttype/forms">
-  <Display>DocumentLibraryForm</Display>
-  <Edit>DocumentLibraryForm</Edit>
-  <New>DocumentLibraryForm</New>
-</FormTemplates>
+<file path=customXml/itemProps1.xml><?xml version="1.0" encoding="utf-8"?>
+<ds:datastoreItem xmlns:ds="http://schemas.openxmlformats.org/officeDocument/2006/customXml" ds:itemID="{4DEF275F-4D14-42BB-B062-39E39121DDB6}">
+  <ds:schemaRefs>
+    <ds:schemaRef ds:uri="http://schemas.microsoft.com/office/infopath/2007/PartnerControls"/>
+    <ds:schemaRef ds:uri="http://schemas.microsoft.com/office/2006/metadata/properties"/>
+    <ds:schemaRef ds:uri="http://purl.org/dc/dcmitype/"/>
+    <ds:schemaRef ds:uri="http://www.w3.org/XML/1998/namespace"/>
+    <ds:schemaRef ds:uri="http://schemas.microsoft.com/office/2006/documentManagement/types"/>
+    <ds:schemaRef ds:uri="http://purl.org/dc/terms/"/>
+    <ds:schemaRef ds:uri="http://schemas.openxmlformats.org/package/2006/metadata/core-properties"/>
+    <ds:schemaRef ds:uri="7401324f-32bb-40b2-aa72-be4933ebf616"/>
+    <ds:schemaRef ds:uri="0763945f-b588-479b-8b34-69271d6243d3"/>
+    <ds:schemaRef ds:uri="http://purl.org/dc/elements/1.1/"/>
+  </ds:schemaRefs>
+</ds:datastoreItem>
 </file>
 
-<file path=customXml/item3.xml><?xml version="1.0" encoding="utf-8"?>
-<p:properties xmlns:p="http://schemas.microsoft.com/office/2006/metadata/properties" xmlns:xsi="http://www.w3.org/2001/XMLSchema-instance" xmlns:pc="http://schemas.microsoft.com/office/infopath/2007/PartnerControls">
-  <documentManagement/>
-</p:properties>
+<file path=customXml/itemProps2.xml><?xml version="1.0" encoding="utf-8"?>
+<ds:datastoreItem xmlns:ds="http://schemas.openxmlformats.org/officeDocument/2006/customXml" ds:itemID="{47DC32A7-81A2-4FF8-8601-D53B8F3609D0}">
+  <ds:schemaRefs>
+    <ds:schemaRef ds:uri="http://schemas.microsoft.com/sharepoint/v3/contenttype/forms"/>
+  </ds:schemaRefs>
+</ds:datastoreItem>
 </file>
 
-<file path=customXml/itemProps1.xml><?xml version="1.0" encoding="utf-8"?>
+<file path=customXml/itemProps3.xml><?xml version="1.0" encoding="utf-8"?>
 <ds:datastoreItem xmlns:ds="http://schemas.openxmlformats.org/officeDocument/2006/customXml" ds:itemID="{F2309ECC-E979-4482-868E-51113A9FEEBA}">
   <ds:schemaRefs>
     <ds:schemaRef ds:uri="http://schemas.microsoft.com/office/2006/metadata/contentType"/>
@@ -6306,29 +7653,4 @@
     <ds:schemaRef ds:uri="http://schemas.microsoft.com/internal/obd"/>
   </ds:schemaRefs>
 </ds:datastoreItem>
-</file>
-
-<file path=customXml/itemProps2.xml><?xml version="1.0" encoding="utf-8"?>
-<ds:datastoreItem xmlns:ds="http://schemas.openxmlformats.org/officeDocument/2006/customXml" ds:itemID="{47DC32A7-81A2-4FF8-8601-D53B8F3609D0}">
-  <ds:schemaRefs>
-    <ds:schemaRef ds:uri="http://schemas.microsoft.com/sharepoint/v3/contenttype/forms"/>
-  </ds:schemaRefs>
-</ds:datastoreItem>
-</file>
-
-<file path=customXml/itemProps3.xml><?xml version="1.0" encoding="utf-8"?>
-<ds:datastoreItem xmlns:ds="http://schemas.openxmlformats.org/officeDocument/2006/customXml" ds:itemID="{4DEF275F-4D14-42BB-B062-39E39121DDB6}">
-  <ds:schemaRefs>
-    <ds:schemaRef ds:uri="http://schemas.microsoft.com/office/infopath/2007/PartnerControls"/>
-    <ds:schemaRef ds:uri="http://schemas.microsoft.com/office/2006/metadata/properties"/>
-    <ds:schemaRef ds:uri="http://purl.org/dc/dcmitype/"/>
-    <ds:schemaRef ds:uri="http://www.w3.org/XML/1998/namespace"/>
-    <ds:schemaRef ds:uri="http://schemas.microsoft.com/office/2006/documentManagement/types"/>
-    <ds:schemaRef ds:uri="http://purl.org/dc/terms/"/>
-    <ds:schemaRef ds:uri="http://schemas.openxmlformats.org/package/2006/metadata/core-properties"/>
-    <ds:schemaRef ds:uri="7401324f-32bb-40b2-aa72-be4933ebf616"/>
-    <ds:schemaRef ds:uri="0763945f-b588-479b-8b34-69271d6243d3"/>
-    <ds:schemaRef ds:uri="http://purl.org/dc/elements/1.1/"/>
-  </ds:schemaRefs>
-</ds:datastoreItem>
 </file>
</xml_diff>